<commit_message>
removed two slides for code smells.
</commit_message>
<xml_diff>
--- a/Slides/Lesson 11 Refactoring, Code Smells and Technical Debt.pptx
+++ b/Slides/Lesson 11 Refactoring, Code Smells and Technical Debt.pptx
@@ -6,7 +6,7 @@
     <p:sldMasterId id="2147483662" r:id="rId2"/>
   </p:sldMasterIdLst>
   <p:notesMasterIdLst>
-    <p:notesMasterId r:id="rId25"/>
+    <p:notesMasterId r:id="rId23"/>
   </p:notesMasterIdLst>
   <p:sldIdLst>
     <p:sldId id="256" r:id="rId3"/>
@@ -20,17 +20,15 @@
     <p:sldId id="264" r:id="rId11"/>
     <p:sldId id="265" r:id="rId12"/>
     <p:sldId id="268" r:id="rId13"/>
-    <p:sldId id="266" r:id="rId14"/>
-    <p:sldId id="267" r:id="rId15"/>
-    <p:sldId id="269" r:id="rId16"/>
-    <p:sldId id="270" r:id="rId17"/>
-    <p:sldId id="271" r:id="rId18"/>
-    <p:sldId id="272" r:id="rId19"/>
-    <p:sldId id="409" r:id="rId20"/>
-    <p:sldId id="410" r:id="rId21"/>
-    <p:sldId id="407" r:id="rId22"/>
-    <p:sldId id="408" r:id="rId23"/>
-    <p:sldId id="376" r:id="rId24"/>
+    <p:sldId id="269" r:id="rId14"/>
+    <p:sldId id="270" r:id="rId15"/>
+    <p:sldId id="271" r:id="rId16"/>
+    <p:sldId id="272" r:id="rId17"/>
+    <p:sldId id="409" r:id="rId18"/>
+    <p:sldId id="410" r:id="rId19"/>
+    <p:sldId id="407" r:id="rId20"/>
+    <p:sldId id="408" r:id="rId21"/>
+    <p:sldId id="376" r:id="rId22"/>
   </p:sldIdLst>
   <p:sldSz cx="13004800" cy="9753600"/>
   <p:notesSz cx="6858000" cy="9144000"/>
@@ -625,7 +623,7 @@
       </p:grpSpPr>
       <p:sp>
         <p:nvSpPr>
-          <p:cNvPr id="217" name="Shape 217"/>
+          <p:cNvPr id="234" name="Shape 234"/>
           <p:cNvSpPr>
             <a:spLocks noGrp="1" noRot="1" noChangeAspect="1"/>
           </p:cNvSpPr>
@@ -648,7 +646,7 @@
       </p:sp>
       <p:sp>
         <p:nvSpPr>
-          <p:cNvPr id="218" name="Shape 218"/>
+          <p:cNvPr id="235" name="Shape 235"/>
           <p:cNvSpPr>
             <a:spLocks noGrp="1"/>
           </p:cNvSpPr>
@@ -665,209 +663,21 @@
           <a:bodyPr/>
           <a:lstStyle/>
           <a:p>
-            <a:pPr marL="228600" indent="-228600" defTabSz="584200">
-              <a:lnSpc>
-                <a:spcPct val="100000"/>
-              </a:lnSpc>
-              <a:buSzPct val="100000"/>
-              <a:buChar char="•"/>
-              <a:defRPr>
-                <a:latin typeface="Lucida Grande"/>
-                <a:ea typeface="Lucida Grande"/>
-                <a:cs typeface="Lucida Grande"/>
-                <a:sym typeface="Lucida Grande"/>
-              </a:defRPr>
-            </a:pPr>
-            <a:r>
-              <a:rPr dirty="0"/>
-              <a:t>some examples of widely used </a:t>
-            </a:r>
-            <a:r>
-              <a:rPr dirty="0" err="1"/>
-              <a:t>refactorings</a:t>
-            </a:r>
-            <a:r>
-              <a:rPr dirty="0"/>
-              <a:t> that are “local” in scope</a:t>
-            </a:r>
-          </a:p>
-          <a:p>
-            <a:pPr marL="228600" indent="-228600" defTabSz="584200">
-              <a:lnSpc>
-                <a:spcPct val="100000"/>
-              </a:lnSpc>
-              <a:buSzPct val="100000"/>
-              <a:buChar char="•"/>
-              <a:defRPr>
-                <a:latin typeface="Lucida Grande"/>
-                <a:ea typeface="Lucida Grande"/>
-                <a:cs typeface="Lucida Grande"/>
-                <a:sym typeface="Lucida Grande"/>
-              </a:defRPr>
-            </a:pPr>
-            <a:r>
-              <a:rPr dirty="0"/>
-              <a:t>useful for restructuring methods</a:t>
-            </a:r>
-          </a:p>
-          <a:p>
-            <a:pPr marL="228600" indent="-228600" defTabSz="584200">
-              <a:lnSpc>
-                <a:spcPct val="100000"/>
-              </a:lnSpc>
-              <a:buSzPct val="100000"/>
-              <a:buChar char="•"/>
-              <a:defRPr>
-                <a:latin typeface="Lucida Grande"/>
-                <a:ea typeface="Lucida Grande"/>
-                <a:cs typeface="Lucida Grande"/>
-                <a:sym typeface="Lucida Grande"/>
-              </a:defRPr>
-            </a:pPr>
-            <a:r>
-              <a:rPr dirty="0"/>
-              <a:t>We already talked about bad names and duplicate code. We would fix these smells by applying refactoring rename and extract method, resp</a:t>
-            </a:r>
-          </a:p>
-          <a:p>
-            <a:pPr marL="228600" indent="-228600" defTabSz="584200">
-              <a:lnSpc>
-                <a:spcPct val="100000"/>
-              </a:lnSpc>
-              <a:buSzPct val="100000"/>
-              <a:buChar char="•"/>
-              <a:defRPr>
-                <a:latin typeface="Lucida Grande"/>
-                <a:ea typeface="Lucida Grande"/>
-                <a:cs typeface="Lucida Grande"/>
-                <a:sym typeface="Lucida Grande"/>
-              </a:defRPr>
-            </a:pPr>
-            <a:r>
-              <a:rPr dirty="0"/>
-              <a:t>Inline method is inverse: when you want to go fold a method back into another</a:t>
-            </a:r>
-          </a:p>
-          <a:p>
-            <a:pPr marL="228600" indent="-228600" defTabSz="584200">
-              <a:lnSpc>
-                <a:spcPct val="100000"/>
-              </a:lnSpc>
-              <a:buSzPct val="100000"/>
-              <a:buChar char="•"/>
-              <a:defRPr>
-                <a:latin typeface="Lucida Grande"/>
-                <a:ea typeface="Lucida Grande"/>
-                <a:cs typeface="Lucida Grande"/>
-                <a:sym typeface="Lucida Grande"/>
-              </a:defRPr>
-            </a:pPr>
-            <a:r>
-              <a:rPr dirty="0"/>
-              <a:t>Extract local variable is like extract method, but what you might do with just an expression, so that a big expression can be more manageable</a:t>
-            </a:r>
-          </a:p>
-          <a:p>
-            <a:pPr marL="228600" indent="-228600" defTabSz="584200">
-              <a:lnSpc>
-                <a:spcPct val="100000"/>
-              </a:lnSpc>
-              <a:buSzPct val="100000"/>
-              <a:buChar char="•"/>
-              <a:defRPr>
-                <a:latin typeface="Lucida Grande"/>
-                <a:ea typeface="Lucida Grande"/>
-                <a:cs typeface="Lucida Grande"/>
-                <a:sym typeface="Lucida Grande"/>
-              </a:defRPr>
-            </a:pPr>
-            <a:r>
-              <a:rPr dirty="0"/>
-              <a:t>Again, inline local is the inverse: eliminating a local variable that is maybe superfluous</a:t>
-            </a:r>
-          </a:p>
-          <a:p>
-            <a:pPr marL="228600" indent="-228600" defTabSz="584200">
-              <a:lnSpc>
-                <a:spcPct val="100000"/>
-              </a:lnSpc>
-              <a:buSzPct val="100000"/>
-              <a:buChar char="•"/>
-              <a:defRPr>
-                <a:latin typeface="Lucida Grande"/>
-                <a:ea typeface="Lucida Grande"/>
-                <a:cs typeface="Lucida Grande"/>
-                <a:sym typeface="Lucida Grande"/>
-              </a:defRPr>
-            </a:pPr>
-            <a:r>
-              <a:rPr dirty="0"/>
-              <a:t>Change function declaration lets us adapt the order of parameters on a method</a:t>
-            </a:r>
-          </a:p>
-          <a:p>
-            <a:pPr marL="279400" indent="-279400" defTabSz="584200">
-              <a:lnSpc>
-                <a:spcPct val="100000"/>
-              </a:lnSpc>
-              <a:buSzPct val="123000"/>
-              <a:buChar char="•"/>
-              <a:defRPr>
-                <a:latin typeface="Lucida Grande"/>
-                <a:ea typeface="Lucida Grande"/>
-                <a:cs typeface="Lucida Grande"/>
-                <a:sym typeface="Lucida Grande"/>
-              </a:defRPr>
-            </a:pPr>
-            <a:r>
-              <a:rPr dirty="0"/>
-              <a:t>encapsulate a field replaces direct field accesses with getters/setters, and </a:t>
-            </a:r>
-          </a:p>
-          <a:p>
-            <a:pPr marL="279400" indent="-279400" defTabSz="584200">
-              <a:lnSpc>
-                <a:spcPct val="100000"/>
-              </a:lnSpc>
-              <a:buSzPct val="123000"/>
-              <a:buChar char="•"/>
-              <a:defRPr>
-                <a:latin typeface="Lucida Grande"/>
-                <a:ea typeface="Lucida Grande"/>
-                <a:cs typeface="Lucida Grande"/>
-                <a:sym typeface="Lucida Grande"/>
-              </a:defRPr>
-            </a:pPr>
-            <a:r>
-              <a:rPr dirty="0"/>
-              <a:t>Convert local to field creates a field with the specified scope to replace a local variable.</a:t>
-            </a:r>
-          </a:p>
-          <a:p>
-            <a:pPr marL="279400" indent="-279400" defTabSz="584200">
-              <a:lnSpc>
-                <a:spcPct val="100000"/>
-              </a:lnSpc>
-              <a:buSzPct val="123000"/>
-              <a:buChar char="•"/>
-              <a:defRPr>
-                <a:latin typeface="Lucida Grande"/>
-                <a:ea typeface="Lucida Grande"/>
-                <a:cs typeface="Lucida Grande"/>
-                <a:sym typeface="Lucida Grande"/>
-              </a:defRPr>
-            </a:pPr>
-            <a:r>
-              <a:rPr dirty="0"/>
-              <a:t>These are just a few of the hundreds of </a:t>
-            </a:r>
-            <a:r>
-              <a:rPr dirty="0" err="1"/>
-              <a:t>refactorings</a:t>
-            </a:r>
-            <a:r>
-              <a:rPr dirty="0"/>
-              <a:t> in Fowler’s book</a:t>
+            <a:r>
+              <a:t>If programmers spend time “cleaning up the code”, then that’s less time spent implementing required functionality - and the schedule is slipping as it is!</a:t>
+            </a:r>
+          </a:p>
+          <a:p>
+            <a:r>
+              <a:t>Refactoring can break code that previously worked</a:t>
+            </a:r>
+          </a:p>
+          <a:p>
+            <a:endParaRPr/>
+          </a:p>
+          <a:p>
+            <a:r>
+              <a:t>Refactoring needs to be systematic, incremental, and safe</a:t>
             </a:r>
           </a:p>
         </p:txBody>
@@ -881,178 +691,6 @@
 </file>
 
 <file path=ppt/notesSlides/notesSlide11.xml><?xml version="1.0" encoding="utf-8"?>
-<p:notes xmlns:a="http://schemas.openxmlformats.org/drawingml/2006/main" xmlns:r="http://schemas.openxmlformats.org/officeDocument/2006/relationships" xmlns:p="http://schemas.openxmlformats.org/presentationml/2006/main">
-  <p:cSld>
-    <p:spTree>
-      <p:nvGrpSpPr>
-        <p:cNvPr id="1" name=""/>
-        <p:cNvGrpSpPr/>
-        <p:nvPr/>
-      </p:nvGrpSpPr>
-      <p:grpSpPr>
-        <a:xfrm>
-          <a:off x="0" y="0"/>
-          <a:ext cx="0" cy="0"/>
-          <a:chOff x="0" y="0"/>
-          <a:chExt cx="0" cy="0"/>
-        </a:xfrm>
-      </p:grpSpPr>
-      <p:sp>
-        <p:nvSpPr>
-          <p:cNvPr id="223" name="Shape 223"/>
-          <p:cNvSpPr>
-            <a:spLocks noGrp="1" noRot="1" noChangeAspect="1"/>
-          </p:cNvSpPr>
-          <p:nvPr>
-            <p:ph type="sldImg"/>
-          </p:nvPr>
-        </p:nvSpPr>
-        <p:spPr>
-          <a:prstGeom prst="rect">
-            <a:avLst/>
-          </a:prstGeom>
-        </p:spPr>
-        <p:txBody>
-          <a:bodyPr/>
-          <a:lstStyle/>
-          <a:p>
-            <a:endParaRPr/>
-          </a:p>
-        </p:txBody>
-      </p:sp>
-      <p:sp>
-        <p:nvSpPr>
-          <p:cNvPr id="224" name="Shape 224"/>
-          <p:cNvSpPr>
-            <a:spLocks noGrp="1"/>
-          </p:cNvSpPr>
-          <p:nvPr>
-            <p:ph type="body" sz="quarter" idx="1"/>
-          </p:nvPr>
-        </p:nvSpPr>
-        <p:spPr>
-          <a:prstGeom prst="rect">
-            <a:avLst/>
-          </a:prstGeom>
-        </p:spPr>
-        <p:txBody>
-          <a:bodyPr/>
-          <a:lstStyle/>
-          <a:p>
-            <a:r>
-              <a:t>refactorings for changing the class hierarchy and/or the types of declarations of variables and fields</a:t>
-            </a:r>
-          </a:p>
-          <a:p>
-            <a:r>
-              <a:t>purpose is to make designs more flexible, e.g., by facilitating the introduction of design patterns </a:t>
-            </a:r>
-          </a:p>
-          <a:p>
-            <a:endParaRPr/>
-          </a:p>
-          <a:p>
-            <a:r>
-              <a:t>Way, way more refactoring than this. Again, over a hundred. What’s most useful is often what’s automated…</a:t>
-            </a:r>
-          </a:p>
-        </p:txBody>
-      </p:sp>
-    </p:spTree>
-  </p:cSld>
-  <p:clrMapOvr>
-    <a:masterClrMapping/>
-  </p:clrMapOvr>
-</p:notes>
-</file>
-
-<file path=ppt/notesSlides/notesSlide12.xml><?xml version="1.0" encoding="utf-8"?>
-<p:notes xmlns:a="http://schemas.openxmlformats.org/drawingml/2006/main" xmlns:r="http://schemas.openxmlformats.org/officeDocument/2006/relationships" xmlns:p="http://schemas.openxmlformats.org/presentationml/2006/main">
-  <p:cSld>
-    <p:spTree>
-      <p:nvGrpSpPr>
-        <p:cNvPr id="1" name=""/>
-        <p:cNvGrpSpPr/>
-        <p:nvPr/>
-      </p:nvGrpSpPr>
-      <p:grpSpPr>
-        <a:xfrm>
-          <a:off x="0" y="0"/>
-          <a:ext cx="0" cy="0"/>
-          <a:chOff x="0" y="0"/>
-          <a:chExt cx="0" cy="0"/>
-        </a:xfrm>
-      </p:grpSpPr>
-      <p:sp>
-        <p:nvSpPr>
-          <p:cNvPr id="234" name="Shape 234"/>
-          <p:cNvSpPr>
-            <a:spLocks noGrp="1" noRot="1" noChangeAspect="1"/>
-          </p:cNvSpPr>
-          <p:nvPr>
-            <p:ph type="sldImg"/>
-          </p:nvPr>
-        </p:nvSpPr>
-        <p:spPr>
-          <a:prstGeom prst="rect">
-            <a:avLst/>
-          </a:prstGeom>
-        </p:spPr>
-        <p:txBody>
-          <a:bodyPr/>
-          <a:lstStyle/>
-          <a:p>
-            <a:endParaRPr/>
-          </a:p>
-        </p:txBody>
-      </p:sp>
-      <p:sp>
-        <p:nvSpPr>
-          <p:cNvPr id="235" name="Shape 235"/>
-          <p:cNvSpPr>
-            <a:spLocks noGrp="1"/>
-          </p:cNvSpPr>
-          <p:nvPr>
-            <p:ph type="body" sz="quarter" idx="1"/>
-          </p:nvPr>
-        </p:nvSpPr>
-        <p:spPr>
-          <a:prstGeom prst="rect">
-            <a:avLst/>
-          </a:prstGeom>
-        </p:spPr>
-        <p:txBody>
-          <a:bodyPr/>
-          <a:lstStyle/>
-          <a:p>
-            <a:r>
-              <a:t>If programmers spend time “cleaning up the code”, then that’s less time spent implementing required functionality - and the schedule is slipping as it is!</a:t>
-            </a:r>
-          </a:p>
-          <a:p>
-            <a:r>
-              <a:t>Refactoring can break code that previously worked</a:t>
-            </a:r>
-          </a:p>
-          <a:p>
-            <a:endParaRPr/>
-          </a:p>
-          <a:p>
-            <a:r>
-              <a:t>Refactoring needs to be systematic, incremental, and safe</a:t>
-            </a:r>
-          </a:p>
-        </p:txBody>
-      </p:sp>
-    </p:spTree>
-  </p:cSld>
-  <p:clrMapOvr>
-    <a:masterClrMapping/>
-  </p:clrMapOvr>
-</p:notes>
-</file>
-
-<file path=ppt/notesSlides/notesSlide13.xml><?xml version="1.0" encoding="utf-8"?>
 <p:notes xmlns:a="http://schemas.openxmlformats.org/drawingml/2006/main" xmlns:r="http://schemas.openxmlformats.org/officeDocument/2006/relationships" xmlns:p="http://schemas.openxmlformats.org/presentationml/2006/main">
   <p:cSld>
     <p:spTree>
@@ -1780,7 +1418,7 @@
       </p:grpSpPr>
       <p:sp>
         <p:nvSpPr>
-          <p:cNvPr id="197" name="Shape 197"/>
+          <p:cNvPr id="217" name="Shape 217"/>
           <p:cNvSpPr>
             <a:spLocks noGrp="1" noRot="1" noChangeAspect="1"/>
           </p:cNvSpPr>
@@ -1803,7 +1441,7 @@
       </p:sp>
       <p:sp>
         <p:nvSpPr>
-          <p:cNvPr id="198" name="Shape 198"/>
+          <p:cNvPr id="218" name="Shape 218"/>
           <p:cNvSpPr>
             <a:spLocks noGrp="1"/>
           </p:cNvSpPr>
@@ -1820,9 +1458,22 @@
           <a:bodyPr/>
           <a:lstStyle/>
           <a:p>
+            <a:pPr marL="228600" indent="-228600" defTabSz="584200">
+              <a:lnSpc>
+                <a:spcPct val="100000"/>
+              </a:lnSpc>
+              <a:buSzPct val="100000"/>
+              <a:buChar char="•"/>
+              <a:defRPr>
+                <a:latin typeface="Lucida Grande"/>
+                <a:ea typeface="Lucida Grande"/>
+                <a:cs typeface="Lucida Grande"/>
+                <a:sym typeface="Lucida Grande"/>
+              </a:defRPr>
+            </a:pPr>
             <a:r>
               <a:rPr dirty="0"/>
-              <a:t>Sadly, however, naming is one of the two hardest things in programming. So, perhaps the most common </a:t>
+              <a:t>some examples of widely used </a:t>
             </a:r>
             <a:r>
               <a:rPr dirty="0" err="1"/>
@@ -1830,20 +1481,187 @@
             </a:r>
             <a:r>
               <a:rPr dirty="0"/>
-              <a:t> we do are the renames: Change Function Declaration (124) (to rename a function), Rename Variable (137), and Rename Field (244). People are often afraid to rename things, thinking it’s not worth the trouble, but a good name can save hours of puzzled incomprehension in the future.</a:t>
-            </a:r>
-          </a:p>
-          <a:p>
-            <a:endParaRPr dirty="0"/>
-          </a:p>
-          <a:p>
+              <a:t> that are “local” in scope</a:t>
+            </a:r>
+          </a:p>
+          <a:p>
+            <a:pPr marL="228600" indent="-228600" defTabSz="584200">
+              <a:lnSpc>
+                <a:spcPct val="100000"/>
+              </a:lnSpc>
+              <a:buSzPct val="100000"/>
+              <a:buChar char="•"/>
+              <a:defRPr>
+                <a:latin typeface="Lucida Grande"/>
+                <a:ea typeface="Lucida Grande"/>
+                <a:cs typeface="Lucida Grande"/>
+                <a:sym typeface="Lucida Grande"/>
+              </a:defRPr>
+            </a:pPr>
             <a:r>
               <a:rPr dirty="0"/>
-              <a:t>Renaming is not just an exercise in changing names. When you can’t think of a good name for something, it’s often a sign of a deeper design malaise. Puzzling over a tricky name has often led us to significant simplifications to our code.</a:t>
-            </a:r>
-          </a:p>
-          <a:p>
-            <a:endParaRPr dirty="0"/>
+              <a:t>useful for restructuring methods</a:t>
+            </a:r>
+          </a:p>
+          <a:p>
+            <a:pPr marL="228600" indent="-228600" defTabSz="584200">
+              <a:lnSpc>
+                <a:spcPct val="100000"/>
+              </a:lnSpc>
+              <a:buSzPct val="100000"/>
+              <a:buChar char="•"/>
+              <a:defRPr>
+                <a:latin typeface="Lucida Grande"/>
+                <a:ea typeface="Lucida Grande"/>
+                <a:cs typeface="Lucida Grande"/>
+                <a:sym typeface="Lucida Grande"/>
+              </a:defRPr>
+            </a:pPr>
+            <a:r>
+              <a:rPr dirty="0"/>
+              <a:t>We already talked about bad names and duplicate code. We would fix these smells by applying refactoring rename and extract method, resp</a:t>
+            </a:r>
+          </a:p>
+          <a:p>
+            <a:pPr marL="228600" indent="-228600" defTabSz="584200">
+              <a:lnSpc>
+                <a:spcPct val="100000"/>
+              </a:lnSpc>
+              <a:buSzPct val="100000"/>
+              <a:buChar char="•"/>
+              <a:defRPr>
+                <a:latin typeface="Lucida Grande"/>
+                <a:ea typeface="Lucida Grande"/>
+                <a:cs typeface="Lucida Grande"/>
+                <a:sym typeface="Lucida Grande"/>
+              </a:defRPr>
+            </a:pPr>
+            <a:r>
+              <a:rPr dirty="0"/>
+              <a:t>Inline method is inverse: when you want to go fold a method back into another</a:t>
+            </a:r>
+          </a:p>
+          <a:p>
+            <a:pPr marL="228600" indent="-228600" defTabSz="584200">
+              <a:lnSpc>
+                <a:spcPct val="100000"/>
+              </a:lnSpc>
+              <a:buSzPct val="100000"/>
+              <a:buChar char="•"/>
+              <a:defRPr>
+                <a:latin typeface="Lucida Grande"/>
+                <a:ea typeface="Lucida Grande"/>
+                <a:cs typeface="Lucida Grande"/>
+                <a:sym typeface="Lucida Grande"/>
+              </a:defRPr>
+            </a:pPr>
+            <a:r>
+              <a:rPr dirty="0"/>
+              <a:t>Extract local variable is like extract method, but what you might do with just an expression, so that a big expression can be more manageable</a:t>
+            </a:r>
+          </a:p>
+          <a:p>
+            <a:pPr marL="228600" indent="-228600" defTabSz="584200">
+              <a:lnSpc>
+                <a:spcPct val="100000"/>
+              </a:lnSpc>
+              <a:buSzPct val="100000"/>
+              <a:buChar char="•"/>
+              <a:defRPr>
+                <a:latin typeface="Lucida Grande"/>
+                <a:ea typeface="Lucida Grande"/>
+                <a:cs typeface="Lucida Grande"/>
+                <a:sym typeface="Lucida Grande"/>
+              </a:defRPr>
+            </a:pPr>
+            <a:r>
+              <a:rPr dirty="0"/>
+              <a:t>Again, inline local is the inverse: eliminating a local variable that is maybe superfluous</a:t>
+            </a:r>
+          </a:p>
+          <a:p>
+            <a:pPr marL="228600" indent="-228600" defTabSz="584200">
+              <a:lnSpc>
+                <a:spcPct val="100000"/>
+              </a:lnSpc>
+              <a:buSzPct val="100000"/>
+              <a:buChar char="•"/>
+              <a:defRPr>
+                <a:latin typeface="Lucida Grande"/>
+                <a:ea typeface="Lucida Grande"/>
+                <a:cs typeface="Lucida Grande"/>
+                <a:sym typeface="Lucida Grande"/>
+              </a:defRPr>
+            </a:pPr>
+            <a:r>
+              <a:rPr dirty="0"/>
+              <a:t>Change function declaration lets us adapt the order of parameters on a method</a:t>
+            </a:r>
+          </a:p>
+          <a:p>
+            <a:pPr marL="279400" indent="-279400" defTabSz="584200">
+              <a:lnSpc>
+                <a:spcPct val="100000"/>
+              </a:lnSpc>
+              <a:buSzPct val="123000"/>
+              <a:buChar char="•"/>
+              <a:defRPr>
+                <a:latin typeface="Lucida Grande"/>
+                <a:ea typeface="Lucida Grande"/>
+                <a:cs typeface="Lucida Grande"/>
+                <a:sym typeface="Lucida Grande"/>
+              </a:defRPr>
+            </a:pPr>
+            <a:r>
+              <a:rPr dirty="0"/>
+              <a:t>encapsulate a field replaces direct field accesses with getters/setters, and </a:t>
+            </a:r>
+          </a:p>
+          <a:p>
+            <a:pPr marL="279400" indent="-279400" defTabSz="584200">
+              <a:lnSpc>
+                <a:spcPct val="100000"/>
+              </a:lnSpc>
+              <a:buSzPct val="123000"/>
+              <a:buChar char="•"/>
+              <a:defRPr>
+                <a:latin typeface="Lucida Grande"/>
+                <a:ea typeface="Lucida Grande"/>
+                <a:cs typeface="Lucida Grande"/>
+                <a:sym typeface="Lucida Grande"/>
+              </a:defRPr>
+            </a:pPr>
+            <a:r>
+              <a:rPr dirty="0"/>
+              <a:t>Convert local to field creates a field with the specified scope to replace a local variable.</a:t>
+            </a:r>
+          </a:p>
+          <a:p>
+            <a:pPr marL="279400" indent="-279400" defTabSz="584200">
+              <a:lnSpc>
+                <a:spcPct val="100000"/>
+              </a:lnSpc>
+              <a:buSzPct val="123000"/>
+              <a:buChar char="•"/>
+              <a:defRPr>
+                <a:latin typeface="Lucida Grande"/>
+                <a:ea typeface="Lucida Grande"/>
+                <a:cs typeface="Lucida Grande"/>
+                <a:sym typeface="Lucida Grande"/>
+              </a:defRPr>
+            </a:pPr>
+            <a:r>
+              <a:rPr dirty="0"/>
+              <a:t>These are just a few of the hundreds of </a:t>
+            </a:r>
+            <a:r>
+              <a:rPr dirty="0" err="1"/>
+              <a:t>refactorings</a:t>
+            </a:r>
+            <a:r>
+              <a:rPr dirty="0"/>
+              <a:t> in Fowler’s book</a:t>
+            </a:r>
           </a:p>
         </p:txBody>
       </p:sp>
@@ -1874,7 +1692,7 @@
       </p:grpSpPr>
       <p:sp>
         <p:nvSpPr>
-          <p:cNvPr id="204" name="Shape 204"/>
+          <p:cNvPr id="223" name="Shape 223"/>
           <p:cNvSpPr>
             <a:spLocks noGrp="1" noRot="1" noChangeAspect="1"/>
           </p:cNvSpPr>
@@ -1897,7 +1715,7 @@
       </p:sp>
       <p:sp>
         <p:nvSpPr>
-          <p:cNvPr id="205" name="Shape 205"/>
+          <p:cNvPr id="224" name="Shape 224"/>
           <p:cNvSpPr>
             <a:spLocks noGrp="1"/>
           </p:cNvSpPr>
@@ -1915,8 +1733,20 @@
           <a:lstStyle/>
           <a:p>
             <a:r>
-              <a:rPr dirty="0"/>
-              <a:t>Shotgun surgery is similar to divergent change but is the opposite. You whiff this when, every time you make a change, you have to make a lot of little edits to a lot of different classes.</a:t>
+              <a:t>refactorings for changing the class hierarchy and/or the types of declarations of variables and fields</a:t>
+            </a:r>
+          </a:p>
+          <a:p>
+            <a:r>
+              <a:t>purpose is to make designs more flexible, e.g., by facilitating the introduction of design patterns </a:t>
+            </a:r>
+          </a:p>
+          <a:p>
+            <a:endParaRPr/>
+          </a:p>
+          <a:p>
+            <a:r>
+              <a:t>Way, way more refactoring than this. Again, over a hundred. What’s most useful is often what’s automated…</a:t>
             </a:r>
           </a:p>
         </p:txBody>
@@ -7183,7 +7013,7 @@
           </a:ln>
           <a:extLst>
             <a:ext uri="{C572A759-6A51-4108-AA02-DFA0A04FC94B}">
-              <ma14:wrappingTextBoxFlag xmlns:ma14="http://schemas.microsoft.com/office/mac/drawingml/2011/main" xmlns:a14="http://schemas.microsoft.com/office/drawing/2010/main" xmlns:m="http://schemas.openxmlformats.org/officeDocument/2006/math" xmlns="" val="1"/>
+              <ma14:wrappingTextBoxFlag xmlns="" xmlns:m="http://schemas.openxmlformats.org/officeDocument/2006/math" xmlns:a14="http://schemas.microsoft.com/office/drawing/2010/main" xmlns:ma14="http://schemas.microsoft.com/office/mac/drawingml/2011/main" val="1"/>
             </a:ext>
           </a:extLst>
         </p:spPr>
@@ -7222,7 +7052,7 @@
           </a:ln>
           <a:extLst>
             <a:ext uri="{C572A759-6A51-4108-AA02-DFA0A04FC94B}">
-              <ma14:wrappingTextBoxFlag xmlns:ma14="http://schemas.microsoft.com/office/mac/drawingml/2011/main" xmlns:a14="http://schemas.microsoft.com/office/drawing/2010/main" xmlns:m="http://schemas.openxmlformats.org/officeDocument/2006/math" xmlns="" val="1"/>
+              <ma14:wrappingTextBoxFlag xmlns="" xmlns:m="http://schemas.openxmlformats.org/officeDocument/2006/math" xmlns:a14="http://schemas.microsoft.com/office/drawing/2010/main" xmlns:ma14="http://schemas.microsoft.com/office/mac/drawingml/2011/main" val="1"/>
             </a:ext>
           </a:extLst>
         </p:spPr>
@@ -8738,7 +8568,7 @@
           </a:ln>
           <a:extLst>
             <a:ext uri="{C572A759-6A51-4108-AA02-DFA0A04FC94B}">
-              <ma14:wrappingTextBoxFlag xmlns:ma14="http://schemas.microsoft.com/office/mac/drawingml/2011/main" xmlns:a14="http://schemas.microsoft.com/office/drawing/2010/main" xmlns:m="http://schemas.openxmlformats.org/officeDocument/2006/math" xmlns="" val="1"/>
+              <ma14:wrappingTextBoxFlag xmlns="" xmlns:m="http://schemas.openxmlformats.org/officeDocument/2006/math" xmlns:a14="http://schemas.microsoft.com/office/drawing/2010/main" xmlns:ma14="http://schemas.microsoft.com/office/mac/drawingml/2011/main" val="1"/>
             </a:ext>
           </a:extLst>
         </p:spPr>
@@ -8912,7 +8742,7 @@
           </a:prstGeom>
           <a:extLst>
             <a:ext uri="{C572A759-6A51-4108-AA02-DFA0A04FC94B}">
-              <ma14:wrappingTextBoxFlag xmlns:ma14="http://schemas.microsoft.com/office/mac/drawingml/2011/main" xmlns:a14="http://schemas.microsoft.com/office/drawing/2010/main" xmlns:m="http://schemas.openxmlformats.org/officeDocument/2006/math" xmlns="" val="1"/>
+              <ma14:wrappingTextBoxFlag xmlns="" xmlns:m="http://schemas.openxmlformats.org/officeDocument/2006/math" xmlns:a14="http://schemas.microsoft.com/office/drawing/2010/main" xmlns:ma14="http://schemas.microsoft.com/office/mac/drawingml/2011/main" val="1"/>
             </a:ext>
           </a:extLst>
         </p:spPr>
@@ -9078,7 +8908,7 @@
           </a:prstGeom>
           <a:extLst>
             <a:ext uri="{C572A759-6A51-4108-AA02-DFA0A04FC94B}">
-              <ma14:wrappingTextBoxFlag xmlns:ma14="http://schemas.microsoft.com/office/mac/drawingml/2011/main" xmlns:a14="http://schemas.microsoft.com/office/drawing/2010/main" xmlns:m="http://schemas.openxmlformats.org/officeDocument/2006/math" xmlns="" val="1"/>
+              <ma14:wrappingTextBoxFlag xmlns="" xmlns:m="http://schemas.openxmlformats.org/officeDocument/2006/math" xmlns:a14="http://schemas.microsoft.com/office/drawing/2010/main" xmlns:ma14="http://schemas.microsoft.com/office/mac/drawingml/2011/main" val="1"/>
             </a:ext>
           </a:extLst>
         </p:spPr>
@@ -9516,7 +9346,7 @@
           </a:ln>
           <a:extLst>
             <a:ext uri="{C572A759-6A51-4108-AA02-DFA0A04FC94B}">
-              <ma14:wrappingTextBoxFlag xmlns:ma14="http://schemas.microsoft.com/office/mac/drawingml/2011/main" xmlns:a14="http://schemas.microsoft.com/office/drawing/2010/main" xmlns:m="http://schemas.openxmlformats.org/officeDocument/2006/math" xmlns="" val="1"/>
+              <ma14:wrappingTextBoxFlag xmlns="" xmlns:m="http://schemas.openxmlformats.org/officeDocument/2006/math" xmlns:a14="http://schemas.microsoft.com/office/drawing/2010/main" xmlns:ma14="http://schemas.microsoft.com/office/mac/drawingml/2011/main" val="1"/>
             </a:ext>
           </a:extLst>
         </p:spPr>
@@ -9551,7 +9381,7 @@
           </a:ln>
           <a:extLst>
             <a:ext uri="{C572A759-6A51-4108-AA02-DFA0A04FC94B}">
-              <ma14:wrappingTextBoxFlag xmlns:ma14="http://schemas.microsoft.com/office/mac/drawingml/2011/main" xmlns:a14="http://schemas.microsoft.com/office/drawing/2010/main" xmlns:m="http://schemas.openxmlformats.org/officeDocument/2006/math" xmlns="" val="1"/>
+              <ma14:wrappingTextBoxFlag xmlns="" xmlns:m="http://schemas.openxmlformats.org/officeDocument/2006/math" xmlns:a14="http://schemas.microsoft.com/office/drawing/2010/main" xmlns:ma14="http://schemas.microsoft.com/office/mac/drawingml/2011/main" val="1"/>
             </a:ext>
           </a:extLst>
         </p:spPr>
@@ -9826,380 +9656,6 @@
 </file>
 
 <file path=ppt/slides/slide12.xml><?xml version="1.0" encoding="utf-8"?>
-<p:sld xmlns:a="http://schemas.openxmlformats.org/drawingml/2006/main" xmlns:r="http://schemas.openxmlformats.org/officeDocument/2006/relationships" xmlns:p="http://schemas.openxmlformats.org/presentationml/2006/main">
-  <p:cSld>
-    <p:spTree>
-      <p:nvGrpSpPr>
-        <p:cNvPr id="1" name=""/>
-        <p:cNvGrpSpPr/>
-        <p:nvPr/>
-      </p:nvGrpSpPr>
-      <p:grpSpPr>
-        <a:xfrm>
-          <a:off x="0" y="0"/>
-          <a:ext cx="0" cy="0"/>
-          <a:chOff x="0" y="0"/>
-          <a:chExt cx="0" cy="0"/>
-        </a:xfrm>
-      </p:grpSpPr>
-      <p:sp>
-        <p:nvSpPr>
-          <p:cNvPr id="193" name="Code Smells"/>
-          <p:cNvSpPr txBox="1">
-            <a:spLocks noGrp="1"/>
-          </p:cNvSpPr>
-          <p:nvPr>
-            <p:ph type="title"/>
-          </p:nvPr>
-        </p:nvSpPr>
-        <p:spPr>
-          <a:prstGeom prst="rect">
-            <a:avLst/>
-          </a:prstGeom>
-        </p:spPr>
-        <p:txBody>
-          <a:bodyPr/>
-          <a:lstStyle>
-            <a:lvl1pPr defTabSz="1369804">
-              <a:defRPr sz="4740" spc="-94"/>
-            </a:lvl1pPr>
-          </a:lstStyle>
-          <a:p>
-            <a:r>
-              <a:t>Code Smells</a:t>
-            </a:r>
-          </a:p>
-        </p:txBody>
-      </p:sp>
-      <p:sp>
-        <p:nvSpPr>
-          <p:cNvPr id="194" name="Mysterious Name"/>
-          <p:cNvSpPr txBox="1">
-            <a:spLocks noGrp="1"/>
-          </p:cNvSpPr>
-          <p:nvPr>
-            <p:ph type="body" idx="21"/>
-          </p:nvPr>
-        </p:nvSpPr>
-        <p:spPr>
-          <a:prstGeom prst="rect">
-            <a:avLst/>
-          </a:prstGeom>
-          <a:extLst>
-            <a:ext uri="{C572A759-6A51-4108-AA02-DFA0A04FC94B}">
-              <ma14:wrappingTextBoxFlag xmlns:ma14="http://schemas.microsoft.com/office/mac/drawingml/2011/main" xmlns:a14="http://schemas.microsoft.com/office/drawing/2010/main" xmlns:m="http://schemas.openxmlformats.org/officeDocument/2006/math" xmlns="" val="1"/>
-            </a:ext>
-          </a:extLst>
-        </p:spPr>
-        <p:txBody>
-          <a:bodyPr>
-            <a:normAutofit lnSpcReduction="10000"/>
-          </a:bodyPr>
-          <a:lstStyle/>
-          <a:p>
-            <a:r>
-              <a:t>Mysterious Name</a:t>
-            </a:r>
-          </a:p>
-        </p:txBody>
-      </p:sp>
-      <p:sp>
-        <p:nvSpPr>
-          <p:cNvPr id="195" name="“We may fantasize about being International Men of Mystery, but our code needs to be mundane and clear”…"/>
-          <p:cNvSpPr txBox="1"/>
-          <p:nvPr/>
-        </p:nvSpPr>
-        <p:spPr>
-          <a:xfrm>
-            <a:off x="-20744" y="4211120"/>
-            <a:ext cx="12122438" cy="2593851"/>
-          </a:xfrm>
-          <a:prstGeom prst="rect">
-            <a:avLst/>
-          </a:prstGeom>
-          <a:ln w="3175">
-            <a:miter lim="400000"/>
-          </a:ln>
-          <a:extLst>
-            <a:ext uri="{C572A759-6A51-4108-AA02-DFA0A04FC94B}">
-              <ma14:wrappingTextBoxFlag xmlns:ma14="http://schemas.microsoft.com/office/mac/drawingml/2011/main" xmlns:a14="http://schemas.microsoft.com/office/drawing/2010/main" xmlns:m="http://schemas.openxmlformats.org/officeDocument/2006/math" xmlns="" val="1"/>
-            </a:ext>
-          </a:extLst>
-        </p:spPr>
-        <p:txBody>
-          <a:bodyPr lIns="27093" tIns="27093" rIns="27093" bIns="27093" anchor="ctr">
-            <a:spAutoFit/>
-          </a:bodyPr>
-          <a:lstStyle/>
-          <a:p>
-            <a:pPr marL="454345" indent="-334151" algn="just">
-              <a:lnSpc>
-                <a:spcPct val="90000"/>
-              </a:lnSpc>
-              <a:defRPr sz="4800" spc="-96">
-                <a:solidFill>
-                  <a:srgbClr val="000000"/>
-                </a:solidFill>
-                <a:latin typeface="Helvetica Neue Medium"/>
-                <a:ea typeface="Helvetica Neue Medium"/>
-                <a:cs typeface="Helvetica Neue Medium"/>
-                <a:sym typeface="Helvetica Neue Medium"/>
-              </a:defRPr>
-            </a:pPr>
-            <a:r>
-              <a:t>“We may fantasize about being International Men of Mystery, but our code needs to be mundane and clear”</a:t>
-            </a:r>
-          </a:p>
-          <a:p>
-            <a:pPr marL="454345" indent="-334151" algn="just">
-              <a:lnSpc>
-                <a:spcPct val="90000"/>
-              </a:lnSpc>
-              <a:defRPr sz="3600" spc="-72">
-                <a:latin typeface="Helvetica Neue Medium"/>
-                <a:ea typeface="Helvetica Neue Medium"/>
-                <a:cs typeface="Helvetica Neue Medium"/>
-                <a:sym typeface="Helvetica Neue Medium"/>
-              </a:defRPr>
-            </a:pPr>
-            <a:r>
-              <a:t>- Martin Fowler on “Mysterious Name”</a:t>
-            </a:r>
-          </a:p>
-        </p:txBody>
-      </p:sp>
-      <p:sp>
-        <p:nvSpPr>
-          <p:cNvPr id="196" name="“Refactoring: Improving the Design of Existing Code,” Martin Fowler, 1992"/>
-          <p:cNvSpPr txBox="1"/>
-          <p:nvPr/>
-        </p:nvSpPr>
-        <p:spPr>
-          <a:xfrm>
-            <a:off x="3108130" y="9265952"/>
-            <a:ext cx="6788540" cy="277098"/>
-          </a:xfrm>
-          <a:prstGeom prst="rect">
-            <a:avLst/>
-          </a:prstGeom>
-          <a:ln w="3175">
-            <a:miter lim="400000"/>
-          </a:ln>
-          <a:extLst>
-            <a:ext uri="{C572A759-6A51-4108-AA02-DFA0A04FC94B}">
-              <ma14:wrappingTextBoxFlag xmlns:ma14="http://schemas.microsoft.com/office/mac/drawingml/2011/main" xmlns:a14="http://schemas.microsoft.com/office/drawing/2010/main" xmlns:m="http://schemas.openxmlformats.org/officeDocument/2006/math" xmlns="" val="1"/>
-            </a:ext>
-          </a:extLst>
-        </p:spPr>
-        <p:txBody>
-          <a:bodyPr wrap="none" lIns="27093" tIns="27093" rIns="27093" bIns="27093" anchor="ctr">
-            <a:spAutoFit/>
-          </a:bodyPr>
-          <a:lstStyle/>
-          <a:p>
-            <a:r>
-              <a:t>“Refactoring: Improving the Design of Existing Code,” Martin Fowler, 1992</a:t>
-            </a:r>
-          </a:p>
-        </p:txBody>
-      </p:sp>
-    </p:spTree>
-  </p:cSld>
-  <p:clrMapOvr>
-    <a:masterClrMapping/>
-  </p:clrMapOvr>
-  <p:transition spd="med"/>
-</p:sld>
-</file>
-
-<file path=ppt/slides/slide13.xml><?xml version="1.0" encoding="utf-8"?>
-<p:sld xmlns:a="http://schemas.openxmlformats.org/drawingml/2006/main" xmlns:r="http://schemas.openxmlformats.org/officeDocument/2006/relationships" xmlns:p="http://schemas.openxmlformats.org/presentationml/2006/main">
-  <p:cSld>
-    <p:spTree>
-      <p:nvGrpSpPr>
-        <p:cNvPr id="1" name=""/>
-        <p:cNvGrpSpPr/>
-        <p:nvPr/>
-      </p:nvGrpSpPr>
-      <p:grpSpPr>
-        <a:xfrm>
-          <a:off x="0" y="0"/>
-          <a:ext cx="0" cy="0"/>
-          <a:chOff x="0" y="0"/>
-          <a:chExt cx="0" cy="0"/>
-        </a:xfrm>
-      </p:grpSpPr>
-      <p:sp>
-        <p:nvSpPr>
-          <p:cNvPr id="200" name="Code Smells"/>
-          <p:cNvSpPr txBox="1">
-            <a:spLocks noGrp="1"/>
-          </p:cNvSpPr>
-          <p:nvPr>
-            <p:ph type="title"/>
-          </p:nvPr>
-        </p:nvSpPr>
-        <p:spPr>
-          <a:prstGeom prst="rect">
-            <a:avLst/>
-          </a:prstGeom>
-        </p:spPr>
-        <p:txBody>
-          <a:bodyPr/>
-          <a:lstStyle>
-            <a:lvl1pPr defTabSz="1369804">
-              <a:defRPr sz="4740" spc="-94"/>
-            </a:lvl1pPr>
-          </a:lstStyle>
-          <a:p>
-            <a:r>
-              <a:t>Code Smells</a:t>
-            </a:r>
-          </a:p>
-        </p:txBody>
-      </p:sp>
-      <p:sp>
-        <p:nvSpPr>
-          <p:cNvPr id="201" name="Shotgun Surgery"/>
-          <p:cNvSpPr txBox="1">
-            <a:spLocks noGrp="1"/>
-          </p:cNvSpPr>
-          <p:nvPr>
-            <p:ph type="body" idx="21"/>
-          </p:nvPr>
-        </p:nvSpPr>
-        <p:spPr>
-          <a:prstGeom prst="rect">
-            <a:avLst/>
-          </a:prstGeom>
-          <a:extLst>
-            <a:ext uri="{C572A759-6A51-4108-AA02-DFA0A04FC94B}">
-              <ma14:wrappingTextBoxFlag xmlns:ma14="http://schemas.microsoft.com/office/mac/drawingml/2011/main" xmlns:a14="http://schemas.microsoft.com/office/drawing/2010/main" xmlns:m="http://schemas.openxmlformats.org/officeDocument/2006/math" xmlns="" val="1"/>
-            </a:ext>
-          </a:extLst>
-        </p:spPr>
-        <p:txBody>
-          <a:bodyPr>
-            <a:normAutofit lnSpcReduction="10000"/>
-          </a:bodyPr>
-          <a:lstStyle/>
-          <a:p>
-            <a:r>
-              <a:t>Shotgun Surgery</a:t>
-            </a:r>
-          </a:p>
-        </p:txBody>
-      </p:sp>
-      <p:sp>
-        <p:nvSpPr>
-          <p:cNvPr id="202" name="“When the changes are all over the place, they are hard to find, and it’s easy to miss an important change.”…"/>
-          <p:cNvSpPr txBox="1"/>
-          <p:nvPr/>
-        </p:nvSpPr>
-        <p:spPr>
-          <a:xfrm>
-            <a:off x="-20744" y="4211120"/>
-            <a:ext cx="12122438" cy="2593851"/>
-          </a:xfrm>
-          <a:prstGeom prst="rect">
-            <a:avLst/>
-          </a:prstGeom>
-          <a:ln w="3175">
-            <a:miter lim="400000"/>
-          </a:ln>
-          <a:extLst>
-            <a:ext uri="{C572A759-6A51-4108-AA02-DFA0A04FC94B}">
-              <ma14:wrappingTextBoxFlag xmlns:ma14="http://schemas.microsoft.com/office/mac/drawingml/2011/main" xmlns:a14="http://schemas.microsoft.com/office/drawing/2010/main" xmlns:m="http://schemas.openxmlformats.org/officeDocument/2006/math" xmlns="" val="1"/>
-            </a:ext>
-          </a:extLst>
-        </p:spPr>
-        <p:txBody>
-          <a:bodyPr lIns="27093" tIns="27093" rIns="27093" bIns="27093" anchor="ctr">
-            <a:spAutoFit/>
-          </a:bodyPr>
-          <a:lstStyle/>
-          <a:p>
-            <a:pPr marL="454345" indent="-334151" algn="just">
-              <a:lnSpc>
-                <a:spcPct val="90000"/>
-              </a:lnSpc>
-              <a:defRPr sz="4800" spc="-96">
-                <a:solidFill>
-                  <a:srgbClr val="000000"/>
-                </a:solidFill>
-                <a:latin typeface="Helvetica Neue Medium"/>
-                <a:ea typeface="Helvetica Neue Medium"/>
-                <a:cs typeface="Helvetica Neue Medium"/>
-                <a:sym typeface="Helvetica Neue Medium"/>
-              </a:defRPr>
-            </a:pPr>
-            <a:r>
-              <a:t>“When the changes are all over the place, they are hard to find, and it’s easy to miss an important change.”</a:t>
-            </a:r>
-          </a:p>
-          <a:p>
-            <a:pPr marL="454345" indent="-334151" algn="just">
-              <a:lnSpc>
-                <a:spcPct val="90000"/>
-              </a:lnSpc>
-              <a:defRPr sz="3600" spc="-72">
-                <a:latin typeface="Helvetica Neue Medium"/>
-                <a:ea typeface="Helvetica Neue Medium"/>
-                <a:cs typeface="Helvetica Neue Medium"/>
-                <a:sym typeface="Helvetica Neue Medium"/>
-              </a:defRPr>
-            </a:pPr>
-            <a:r>
-              <a:t>- Martin Fowler on “Shotgun Surgery”</a:t>
-            </a:r>
-          </a:p>
-        </p:txBody>
-      </p:sp>
-      <p:sp>
-        <p:nvSpPr>
-          <p:cNvPr id="203" name="“Refactoring: Improving the Design of Existing Code,” Martin Fowler, 1992"/>
-          <p:cNvSpPr txBox="1"/>
-          <p:nvPr/>
-        </p:nvSpPr>
-        <p:spPr>
-          <a:xfrm>
-            <a:off x="3108130" y="9265952"/>
-            <a:ext cx="6788540" cy="277098"/>
-          </a:xfrm>
-          <a:prstGeom prst="rect">
-            <a:avLst/>
-          </a:prstGeom>
-          <a:ln w="3175">
-            <a:miter lim="400000"/>
-          </a:ln>
-          <a:extLst>
-            <a:ext uri="{C572A759-6A51-4108-AA02-DFA0A04FC94B}">
-              <ma14:wrappingTextBoxFlag xmlns:ma14="http://schemas.microsoft.com/office/mac/drawingml/2011/main" xmlns:a14="http://schemas.microsoft.com/office/drawing/2010/main" xmlns:m="http://schemas.openxmlformats.org/officeDocument/2006/math" xmlns="" val="1"/>
-            </a:ext>
-          </a:extLst>
-        </p:spPr>
-        <p:txBody>
-          <a:bodyPr wrap="none" lIns="27093" tIns="27093" rIns="27093" bIns="27093" anchor="ctr">
-            <a:spAutoFit/>
-          </a:bodyPr>
-          <a:lstStyle/>
-          <a:p>
-            <a:r>
-              <a:t>“Refactoring: Improving the Design of Existing Code,” Martin Fowler, 1992</a:t>
-            </a:r>
-          </a:p>
-        </p:txBody>
-      </p:sp>
-    </p:spTree>
-  </p:cSld>
-  <p:clrMapOvr>
-    <a:masterClrMapping/>
-  </p:clrMapOvr>
-  <p:transition spd="med"/>
-</p:sld>
-</file>
-
-<file path=ppt/slides/slide14.xml><?xml version="1.0" encoding="utf-8"?>
 <p:sld xmlns:a="http://schemas.openxmlformats.org/drawingml/2006/main" xmlns:r="http://schemas.openxmlformats.org/officeDocument/2006/relationships" xmlns:p="http://schemas.openxmlformats.org/presentationml/2006/main">
   <p:cSld>
     <p:spTree>
@@ -11123,7 +10579,7 @@
 </p:sld>
 </file>
 
-<file path=ppt/slides/slide15.xml><?xml version="1.0" encoding="utf-8"?>
+<file path=ppt/slides/slide13.xml><?xml version="1.0" encoding="utf-8"?>
 <p:sld xmlns:a="http://schemas.openxmlformats.org/drawingml/2006/main" xmlns:r="http://schemas.openxmlformats.org/officeDocument/2006/relationships" xmlns:p="http://schemas.openxmlformats.org/presentationml/2006/main">
   <p:cSld>
     <p:spTree>
@@ -11683,7 +11139,7 @@
 </p:sld>
 </file>
 
-<file path=ppt/slides/slide16.xml><?xml version="1.0" encoding="utf-8"?>
+<file path=ppt/slides/slide14.xml><?xml version="1.0" encoding="utf-8"?>
 <p:sld xmlns:a="http://schemas.openxmlformats.org/drawingml/2006/main" xmlns:r="http://schemas.openxmlformats.org/officeDocument/2006/relationships" xmlns:p="http://schemas.openxmlformats.org/presentationml/2006/main">
   <p:cSld>
     <p:spTree>
@@ -11813,7 +11269,7 @@
 </p:sld>
 </file>
 
-<file path=ppt/slides/slide17.xml><?xml version="1.0" encoding="utf-8"?>
+<file path=ppt/slides/slide15.xml><?xml version="1.0" encoding="utf-8"?>
 <p:sld xmlns:a="http://schemas.openxmlformats.org/drawingml/2006/main" xmlns:r="http://schemas.openxmlformats.org/officeDocument/2006/relationships" xmlns:p="http://schemas.openxmlformats.org/presentationml/2006/main">
   <p:cSld>
     <p:spTree>
@@ -11939,7 +11395,7 @@
 </p:sld>
 </file>
 
-<file path=ppt/slides/slide18.xml><?xml version="1.0" encoding="utf-8"?>
+<file path=ppt/slides/slide16.xml><?xml version="1.0" encoding="utf-8"?>
 <p:sld xmlns:a="http://schemas.openxmlformats.org/drawingml/2006/main" xmlns:r="http://schemas.openxmlformats.org/officeDocument/2006/relationships" xmlns:p="http://schemas.openxmlformats.org/presentationml/2006/main">
   <p:cSld>
     <p:spTree>
@@ -12305,7 +11761,7 @@
 </p:sld>
 </file>
 
-<file path=ppt/slides/slide19.xml><?xml version="1.0" encoding="utf-8"?>
+<file path=ppt/slides/slide17.xml><?xml version="1.0" encoding="utf-8"?>
 <p:sld xmlns:a="http://schemas.openxmlformats.org/drawingml/2006/main" xmlns:r="http://schemas.openxmlformats.org/officeDocument/2006/relationships" xmlns:p="http://schemas.openxmlformats.org/presentationml/2006/main">
   <p:cSld>
     <p:spTree>
@@ -12519,7 +11975,7 @@
                 <a:latin typeface="Calibri" panose="020F0502020204030204"/>
               </a:rPr>
               <a:pPr defTabSz="975390" hangingPunct="1"/>
-              <a:t>19</a:t>
+              <a:t>17</a:t>
             </a:fld>
             <a:endParaRPr lang="en-US" kern="1200">
               <a:solidFill>
@@ -12559,7 +12015,7 @@
           </a:ln>
           <a:extLst>
             <a:ext uri="{C572A759-6A51-4108-AA02-DFA0A04FC94B}">
-              <ma14:wrappingTextBoxFlag xmlns:ma14="http://schemas.microsoft.com/office/mac/drawingml/2011/main" xmlns:a14="http://schemas.microsoft.com/office/drawing/2010/main" xmlns:m="http://schemas.openxmlformats.org/officeDocument/2006/math" xmlns="" val="1"/>
+              <ma14:wrappingTextBoxFlag xmlns="" xmlns:m="http://schemas.openxmlformats.org/officeDocument/2006/math" xmlns:a14="http://schemas.microsoft.com/office/drawing/2010/main" xmlns:ma14="http://schemas.microsoft.com/office/mac/drawingml/2011/main" val="1"/>
             </a:ext>
           </a:extLst>
         </p:spPr>
@@ -13125,7 +12581,7 @@
 </p:sld>
 </file>
 
-<file path=ppt/slides/slide2.xml><?xml version="1.0" encoding="utf-8"?>
+<file path=ppt/slides/slide18.xml><?xml version="1.0" encoding="utf-8"?>
 <p:sld xmlns:a="http://schemas.openxmlformats.org/drawingml/2006/main" xmlns:r="http://schemas.openxmlformats.org/officeDocument/2006/relationships" xmlns:p="http://schemas.openxmlformats.org/presentationml/2006/main">
   <p:cSld>
     <p:spTree>
@@ -13144,164 +12600,6 @@
       </p:grpSpPr>
       <p:sp>
         <p:nvSpPr>
-          <p:cNvPr id="138" name="Learning Goals"/>
-          <p:cNvSpPr txBox="1">
-            <a:spLocks noGrp="1"/>
-          </p:cNvSpPr>
-          <p:nvPr>
-            <p:ph type="title"/>
-          </p:nvPr>
-        </p:nvSpPr>
-        <p:spPr>
-          <a:prstGeom prst="rect">
-            <a:avLst/>
-          </a:prstGeom>
-        </p:spPr>
-        <p:txBody>
-          <a:bodyPr/>
-          <a:lstStyle>
-            <a:lvl1pPr defTabSz="1369804">
-              <a:defRPr sz="4740" spc="-94"/>
-            </a:lvl1pPr>
-          </a:lstStyle>
-          <a:p>
-            <a:r>
-              <a:t>Learning Goals</a:t>
-            </a:r>
-          </a:p>
-        </p:txBody>
-      </p:sp>
-      <p:sp>
-        <p:nvSpPr>
-          <p:cNvPr id="139" name="By the end of this lesson, you should be able to…"/>
-          <p:cNvSpPr txBox="1">
-            <a:spLocks noGrp="1"/>
-          </p:cNvSpPr>
-          <p:nvPr>
-            <p:ph type="body" idx="21"/>
-          </p:nvPr>
-        </p:nvSpPr>
-        <p:spPr>
-          <a:prstGeom prst="rect">
-            <a:avLst/>
-          </a:prstGeom>
-          <a:extLst>
-            <a:ext uri="{C572A759-6A51-4108-AA02-DFA0A04FC94B}">
-              <ma14:wrappingTextBoxFlag xmlns:ma14="http://schemas.microsoft.com/office/mac/drawingml/2011/main" xmlns:a14="http://schemas.microsoft.com/office/drawing/2010/main" xmlns:m="http://schemas.openxmlformats.org/officeDocument/2006/math" xmlns="" val="1"/>
-            </a:ext>
-          </a:extLst>
-        </p:spPr>
-        <p:txBody>
-          <a:bodyPr>
-            <a:normAutofit lnSpcReduction="10000"/>
-          </a:bodyPr>
-          <a:lstStyle>
-            <a:lvl1pPr>
-              <a:defRPr>
-                <a:solidFill>
-                  <a:srgbClr val="005493"/>
-                </a:solidFill>
-              </a:defRPr>
-            </a:lvl1pPr>
-          </a:lstStyle>
-          <a:p>
-            <a:r>
-              <a:rPr dirty="0"/>
-              <a:t>By the end of this lesson, you should be able to…</a:t>
-            </a:r>
-          </a:p>
-        </p:txBody>
-      </p:sp>
-      <p:sp>
-        <p:nvSpPr>
-          <p:cNvPr id="140" name="Apply refactoring techniques to improve code quality…"/>
-          <p:cNvSpPr txBox="1">
-            <a:spLocks noGrp="1"/>
-          </p:cNvSpPr>
-          <p:nvPr>
-            <p:ph type="body" idx="1"/>
-          </p:nvPr>
-        </p:nvSpPr>
-        <p:spPr>
-          <a:xfrm>
-            <a:off x="643466" y="3500567"/>
-            <a:ext cx="11717868" cy="4403207"/>
-          </a:xfrm>
-          <a:prstGeom prst="rect">
-            <a:avLst/>
-          </a:prstGeom>
-        </p:spPr>
-        <p:txBody>
-          <a:bodyPr>
-            <a:normAutofit lnSpcReduction="10000"/>
-          </a:bodyPr>
-          <a:lstStyle/>
-          <a:p>
-            <a:pPr marL="571500" indent="-571500">
-              <a:buFont typeface="Arial" panose="020B0604020202020204" pitchFamily="34" charset="0"/>
-              <a:buChar char="•"/>
-            </a:pPr>
-            <a:r>
-              <a:rPr lang="en-US" dirty="0"/>
-              <a:t>Describe different kinds of “Refactoring”: restructuring of code to improve structure.</a:t>
-            </a:r>
-          </a:p>
-          <a:p>
-            <a:pPr marL="571500" indent="-571500">
-              <a:buFont typeface="Arial" panose="020B0604020202020204" pitchFamily="34" charset="0"/>
-              <a:buChar char="•"/>
-            </a:pPr>
-            <a:r>
-              <a:rPr lang="en-US" sz="4000" dirty="0"/>
-              <a:t>Review some common code “smells” (anti-patterns).</a:t>
-            </a:r>
-          </a:p>
-          <a:p>
-            <a:pPr marL="571500" indent="-571500">
-              <a:buFont typeface="Arial" panose="020B0604020202020204" pitchFamily="34" charset="0"/>
-              <a:buChar char="•"/>
-            </a:pPr>
-            <a:r>
-              <a:rPr lang="en-US" sz="4000" dirty="0">
-                <a:solidFill>
-                  <a:schemeClr val="tx1">
-                    <a:lumMod val="50000"/>
-                  </a:schemeClr>
-                </a:solidFill>
-              </a:rPr>
-              <a:t>Identify the “technical debt” metaphor; Indicate when and where technical debt is appropriate to accrue versus retire.</a:t>
-            </a:r>
-          </a:p>
-        </p:txBody>
-      </p:sp>
-    </p:spTree>
-  </p:cSld>
-  <p:clrMapOvr>
-    <a:masterClrMapping/>
-  </p:clrMapOvr>
-  <p:transition spd="med"/>
-</p:sld>
-</file>
-
-<file path=ppt/slides/slide20.xml><?xml version="1.0" encoding="utf-8"?>
-<p:sld xmlns:a="http://schemas.openxmlformats.org/drawingml/2006/main" xmlns:r="http://schemas.openxmlformats.org/officeDocument/2006/relationships" xmlns:p="http://schemas.openxmlformats.org/presentationml/2006/main">
-  <p:cSld>
-    <p:spTree>
-      <p:nvGrpSpPr>
-        <p:cNvPr id="1" name=""/>
-        <p:cNvGrpSpPr/>
-        <p:nvPr/>
-      </p:nvGrpSpPr>
-      <p:grpSpPr>
-        <a:xfrm>
-          <a:off x="0" y="0"/>
-          <a:ext cx="0" cy="0"/>
-          <a:chOff x="0" y="0"/>
-          <a:chExt cx="0" cy="0"/>
-        </a:xfrm>
-      </p:grpSpPr>
-      <p:sp>
-        <p:nvSpPr>
           <p:cNvPr id="3" name="Content Placeholder 2">
             <a:extLst>
               <a:ext uri="{FF2B5EF4-FFF2-40B4-BE49-F238E27FC236}">
@@ -13413,7 +12711,7 @@
                 <a:latin typeface="Calibri" panose="020F0502020204030204"/>
               </a:rPr>
               <a:pPr defTabSz="975390" hangingPunct="1"/>
-              <a:t>20</a:t>
+              <a:t>18</a:t>
             </a:fld>
             <a:endParaRPr lang="en-US" kern="1200">
               <a:solidFill>
@@ -13453,7 +12751,7 @@
           </a:ln>
           <a:extLst>
             <a:ext uri="{C572A759-6A51-4108-AA02-DFA0A04FC94B}">
-              <ma14:wrappingTextBoxFlag xmlns:ma14="http://schemas.microsoft.com/office/mac/drawingml/2011/main" xmlns:a14="http://schemas.microsoft.com/office/drawing/2010/main" xmlns:m="http://schemas.openxmlformats.org/officeDocument/2006/math" xmlns="" val="1"/>
+              <ma14:wrappingTextBoxFlag xmlns="" xmlns:m="http://schemas.openxmlformats.org/officeDocument/2006/math" xmlns:a14="http://schemas.microsoft.com/office/drawing/2010/main" xmlns:ma14="http://schemas.microsoft.com/office/mac/drawingml/2011/main" val="1"/>
             </a:ext>
           </a:extLst>
         </p:spPr>
@@ -13744,7 +13042,7 @@
 </p:sld>
 </file>
 
-<file path=ppt/slides/slide21.xml><?xml version="1.0" encoding="utf-8"?>
+<file path=ppt/slides/slide19.xml><?xml version="1.0" encoding="utf-8"?>
 <p:sld xmlns:a="http://schemas.openxmlformats.org/drawingml/2006/main" xmlns:r="http://schemas.openxmlformats.org/officeDocument/2006/relationships" xmlns:p="http://schemas.openxmlformats.org/presentationml/2006/main">
   <p:cSld>
     <p:spTree>
@@ -13905,7 +13203,7 @@
                 <a:latin typeface="Calibri" panose="020F0502020204030204"/>
               </a:rPr>
               <a:pPr defTabSz="975390" hangingPunct="1"/>
-              <a:t>21</a:t>
+              <a:t>19</a:t>
             </a:fld>
             <a:endParaRPr lang="en-US" kern="1200">
               <a:solidFill>
@@ -14434,7 +13732,7 @@
           </a:ln>
           <a:extLst>
             <a:ext uri="{C572A759-6A51-4108-AA02-DFA0A04FC94B}">
-              <ma14:wrappingTextBoxFlag xmlns:ma14="http://schemas.microsoft.com/office/mac/drawingml/2011/main" xmlns:a14="http://schemas.microsoft.com/office/drawing/2010/main" xmlns:m="http://schemas.openxmlformats.org/officeDocument/2006/math" xmlns="" val="1"/>
+              <ma14:wrappingTextBoxFlag xmlns="" xmlns:m="http://schemas.openxmlformats.org/officeDocument/2006/math" xmlns:a14="http://schemas.microsoft.com/office/drawing/2010/main" xmlns:ma14="http://schemas.microsoft.com/office/mac/drawingml/2011/main" val="1"/>
             </a:ext>
           </a:extLst>
         </p:spPr>
@@ -14725,7 +14023,7 @@
 </p:sld>
 </file>
 
-<file path=ppt/slides/slide22.xml><?xml version="1.0" encoding="utf-8"?>
+<file path=ppt/slides/slide2.xml><?xml version="1.0" encoding="utf-8"?>
 <p:sld xmlns:a="http://schemas.openxmlformats.org/drawingml/2006/main" xmlns:r="http://schemas.openxmlformats.org/officeDocument/2006/relationships" xmlns:p="http://schemas.openxmlformats.org/presentationml/2006/main">
   <p:cSld>
     <p:spTree>
@@ -14744,6 +14042,164 @@
       </p:grpSpPr>
       <p:sp>
         <p:nvSpPr>
+          <p:cNvPr id="138" name="Learning Goals"/>
+          <p:cNvSpPr txBox="1">
+            <a:spLocks noGrp="1"/>
+          </p:cNvSpPr>
+          <p:nvPr>
+            <p:ph type="title"/>
+          </p:nvPr>
+        </p:nvSpPr>
+        <p:spPr>
+          <a:prstGeom prst="rect">
+            <a:avLst/>
+          </a:prstGeom>
+        </p:spPr>
+        <p:txBody>
+          <a:bodyPr/>
+          <a:lstStyle>
+            <a:lvl1pPr defTabSz="1369804">
+              <a:defRPr sz="4740" spc="-94"/>
+            </a:lvl1pPr>
+          </a:lstStyle>
+          <a:p>
+            <a:r>
+              <a:t>Learning Goals</a:t>
+            </a:r>
+          </a:p>
+        </p:txBody>
+      </p:sp>
+      <p:sp>
+        <p:nvSpPr>
+          <p:cNvPr id="139" name="By the end of this lesson, you should be able to…"/>
+          <p:cNvSpPr txBox="1">
+            <a:spLocks noGrp="1"/>
+          </p:cNvSpPr>
+          <p:nvPr>
+            <p:ph type="body" idx="21"/>
+          </p:nvPr>
+        </p:nvSpPr>
+        <p:spPr>
+          <a:prstGeom prst="rect">
+            <a:avLst/>
+          </a:prstGeom>
+          <a:extLst>
+            <a:ext uri="{C572A759-6A51-4108-AA02-DFA0A04FC94B}">
+              <ma14:wrappingTextBoxFlag xmlns="" xmlns:m="http://schemas.openxmlformats.org/officeDocument/2006/math" xmlns:a14="http://schemas.microsoft.com/office/drawing/2010/main" xmlns:ma14="http://schemas.microsoft.com/office/mac/drawingml/2011/main" val="1"/>
+            </a:ext>
+          </a:extLst>
+        </p:spPr>
+        <p:txBody>
+          <a:bodyPr>
+            <a:normAutofit lnSpcReduction="10000"/>
+          </a:bodyPr>
+          <a:lstStyle>
+            <a:lvl1pPr>
+              <a:defRPr>
+                <a:solidFill>
+                  <a:srgbClr val="005493"/>
+                </a:solidFill>
+              </a:defRPr>
+            </a:lvl1pPr>
+          </a:lstStyle>
+          <a:p>
+            <a:r>
+              <a:rPr dirty="0"/>
+              <a:t>By the end of this lesson, you should be able to…</a:t>
+            </a:r>
+          </a:p>
+        </p:txBody>
+      </p:sp>
+      <p:sp>
+        <p:nvSpPr>
+          <p:cNvPr id="140" name="Apply refactoring techniques to improve code quality…"/>
+          <p:cNvSpPr txBox="1">
+            <a:spLocks noGrp="1"/>
+          </p:cNvSpPr>
+          <p:nvPr>
+            <p:ph type="body" idx="1"/>
+          </p:nvPr>
+        </p:nvSpPr>
+        <p:spPr>
+          <a:xfrm>
+            <a:off x="643466" y="3500567"/>
+            <a:ext cx="11717868" cy="4403207"/>
+          </a:xfrm>
+          <a:prstGeom prst="rect">
+            <a:avLst/>
+          </a:prstGeom>
+        </p:spPr>
+        <p:txBody>
+          <a:bodyPr>
+            <a:normAutofit lnSpcReduction="10000"/>
+          </a:bodyPr>
+          <a:lstStyle/>
+          <a:p>
+            <a:pPr marL="571500" indent="-571500">
+              <a:buFont typeface="Arial" panose="020B0604020202020204" pitchFamily="34" charset="0"/>
+              <a:buChar char="•"/>
+            </a:pPr>
+            <a:r>
+              <a:rPr lang="en-US" dirty="0"/>
+              <a:t>Describe different kinds of “Refactoring”: restructuring of code to improve structure.</a:t>
+            </a:r>
+          </a:p>
+          <a:p>
+            <a:pPr marL="571500" indent="-571500">
+              <a:buFont typeface="Arial" panose="020B0604020202020204" pitchFamily="34" charset="0"/>
+              <a:buChar char="•"/>
+            </a:pPr>
+            <a:r>
+              <a:rPr lang="en-US" sz="4000" dirty="0"/>
+              <a:t>Review some common code “smells” (anti-patterns).</a:t>
+            </a:r>
+          </a:p>
+          <a:p>
+            <a:pPr marL="571500" indent="-571500">
+              <a:buFont typeface="Arial" panose="020B0604020202020204" pitchFamily="34" charset="0"/>
+              <a:buChar char="•"/>
+            </a:pPr>
+            <a:r>
+              <a:rPr lang="en-US" sz="4000" dirty="0">
+                <a:solidFill>
+                  <a:schemeClr val="tx1">
+                    <a:lumMod val="50000"/>
+                  </a:schemeClr>
+                </a:solidFill>
+              </a:rPr>
+              <a:t>Identify the “technical debt” metaphor; Indicate when and where technical debt is appropriate to accrue versus retire.</a:t>
+            </a:r>
+          </a:p>
+        </p:txBody>
+      </p:sp>
+    </p:spTree>
+  </p:cSld>
+  <p:clrMapOvr>
+    <a:masterClrMapping/>
+  </p:clrMapOvr>
+  <p:transition spd="med"/>
+</p:sld>
+</file>
+
+<file path=ppt/slides/slide20.xml><?xml version="1.0" encoding="utf-8"?>
+<p:sld xmlns:a="http://schemas.openxmlformats.org/drawingml/2006/main" xmlns:r="http://schemas.openxmlformats.org/officeDocument/2006/relationships" xmlns:p="http://schemas.openxmlformats.org/presentationml/2006/main">
+  <p:cSld>
+    <p:spTree>
+      <p:nvGrpSpPr>
+        <p:cNvPr id="1" name=""/>
+        <p:cNvGrpSpPr/>
+        <p:nvPr/>
+      </p:nvGrpSpPr>
+      <p:grpSpPr>
+        <a:xfrm>
+          <a:off x="0" y="0"/>
+          <a:ext cx="0" cy="0"/>
+          <a:chOff x="0" y="0"/>
+          <a:chExt cx="0" cy="0"/>
+        </a:xfrm>
+      </p:grpSpPr>
+      <p:sp>
+        <p:nvSpPr>
           <p:cNvPr id="2" name="Title 1">
             <a:extLst>
               <a:ext uri="{FF2B5EF4-FFF2-40B4-BE49-F238E27FC236}">
@@ -14872,7 +14328,7 @@
                 <a:latin typeface="Calibri" panose="020F0502020204030204"/>
               </a:rPr>
               <a:pPr defTabSz="975390" hangingPunct="1"/>
-              <a:t>22</a:t>
+              <a:t>20</a:t>
             </a:fld>
             <a:endParaRPr lang="en-US" kern="1200">
               <a:solidFill>
@@ -15370,7 +14826,7 @@
           </a:prstGeom>
           <a:extLst>
             <a:ext uri="{C572A759-6A51-4108-AA02-DFA0A04FC94B}">
-              <ma14:wrappingTextBoxFlag xmlns:ma14="http://schemas.microsoft.com/office/mac/drawingml/2011/main" xmlns:a14="http://schemas.microsoft.com/office/drawing/2010/main" xmlns:m="http://schemas.openxmlformats.org/officeDocument/2006/math" xmlns="" val="1"/>
+              <ma14:wrappingTextBoxFlag xmlns="" xmlns:m="http://schemas.openxmlformats.org/officeDocument/2006/math" xmlns:a14="http://schemas.microsoft.com/office/drawing/2010/main" xmlns:ma14="http://schemas.microsoft.com/office/mac/drawingml/2011/main" val="1"/>
             </a:ext>
           </a:extLst>
         </p:spPr>
@@ -15428,7 +14884,7 @@
           </a:ln>
           <a:extLst>
             <a:ext uri="{C572A759-6A51-4108-AA02-DFA0A04FC94B}">
-              <ma14:wrappingTextBoxFlag xmlns:ma14="http://schemas.microsoft.com/office/mac/drawingml/2011/main" xmlns:a14="http://schemas.microsoft.com/office/drawing/2010/main" xmlns:m="http://schemas.openxmlformats.org/officeDocument/2006/math" xmlns="" val="1"/>
+              <ma14:wrappingTextBoxFlag xmlns="" xmlns:m="http://schemas.openxmlformats.org/officeDocument/2006/math" xmlns:a14="http://schemas.microsoft.com/office/drawing/2010/main" xmlns:ma14="http://schemas.microsoft.com/office/mac/drawingml/2011/main" val="1"/>
             </a:ext>
           </a:extLst>
         </p:spPr>
@@ -15980,7 +15436,7 @@
           </a:prstGeom>
           <a:extLst>
             <a:ext uri="{C572A759-6A51-4108-AA02-DFA0A04FC94B}">
-              <ma14:wrappingTextBoxFlag xmlns:ma14="http://schemas.microsoft.com/office/mac/drawingml/2011/main" xmlns:a14="http://schemas.microsoft.com/office/drawing/2010/main" xmlns:m="http://schemas.openxmlformats.org/officeDocument/2006/math" xmlns="" val="1"/>
+              <ma14:wrappingTextBoxFlag xmlns="" xmlns:m="http://schemas.openxmlformats.org/officeDocument/2006/math" xmlns:a14="http://schemas.microsoft.com/office/drawing/2010/main" xmlns:ma14="http://schemas.microsoft.com/office/mac/drawingml/2011/main" val="1"/>
             </a:ext>
           </a:extLst>
         </p:spPr>
@@ -16015,7 +15471,7 @@
           </a:ln>
           <a:extLst>
             <a:ext uri="{C572A759-6A51-4108-AA02-DFA0A04FC94B}">
-              <ma14:wrappingTextBoxFlag xmlns:ma14="http://schemas.microsoft.com/office/mac/drawingml/2011/main" xmlns:a14="http://schemas.microsoft.com/office/drawing/2010/main" xmlns:m="http://schemas.openxmlformats.org/officeDocument/2006/math" xmlns="" val="1"/>
+              <ma14:wrappingTextBoxFlag xmlns="" xmlns:m="http://schemas.openxmlformats.org/officeDocument/2006/math" xmlns:a14="http://schemas.microsoft.com/office/drawing/2010/main" xmlns:ma14="http://schemas.microsoft.com/office/mac/drawingml/2011/main" val="1"/>
             </a:ext>
           </a:extLst>
         </p:spPr>
@@ -16203,7 +15659,7 @@
           </a:ln>
           <a:extLst>
             <a:ext uri="{C572A759-6A51-4108-AA02-DFA0A04FC94B}">
-              <ma14:wrappingTextBoxFlag xmlns:ma14="http://schemas.microsoft.com/office/mac/drawingml/2011/main" xmlns:a14="http://schemas.microsoft.com/office/drawing/2010/main" xmlns:m="http://schemas.openxmlformats.org/officeDocument/2006/math" xmlns="" val="1"/>
+              <ma14:wrappingTextBoxFlag xmlns="" xmlns:m="http://schemas.openxmlformats.org/officeDocument/2006/math" xmlns:a14="http://schemas.microsoft.com/office/drawing/2010/main" xmlns:ma14="http://schemas.microsoft.com/office/mac/drawingml/2011/main" val="1"/>
             </a:ext>
           </a:extLst>
         </p:spPr>
@@ -16375,7 +15831,7 @@
           </a:ln>
           <a:extLst>
             <a:ext uri="{C572A759-6A51-4108-AA02-DFA0A04FC94B}">
-              <ma14:wrappingTextBoxFlag xmlns:ma14="http://schemas.microsoft.com/office/mac/drawingml/2011/main" xmlns:a14="http://schemas.microsoft.com/office/drawing/2010/main" xmlns:m="http://schemas.openxmlformats.org/officeDocument/2006/math" xmlns="" val="1"/>
+              <ma14:wrappingTextBoxFlag xmlns="" xmlns:m="http://schemas.openxmlformats.org/officeDocument/2006/math" xmlns:a14="http://schemas.microsoft.com/office/drawing/2010/main" xmlns:ma14="http://schemas.microsoft.com/office/mac/drawingml/2011/main" val="1"/>
             </a:ext>
           </a:extLst>
         </p:spPr>
@@ -16418,7 +15874,7 @@
           </a:ln>
           <a:extLst>
             <a:ext uri="{C572A759-6A51-4108-AA02-DFA0A04FC94B}">
-              <ma14:wrappingTextBoxFlag xmlns:ma14="http://schemas.microsoft.com/office/mac/drawingml/2011/main" xmlns:a14="http://schemas.microsoft.com/office/drawing/2010/main" xmlns:m="http://schemas.openxmlformats.org/officeDocument/2006/math" xmlns="" val="1"/>
+              <ma14:wrappingTextBoxFlag xmlns="" xmlns:m="http://schemas.openxmlformats.org/officeDocument/2006/math" xmlns:a14="http://schemas.microsoft.com/office/drawing/2010/main" xmlns:ma14="http://schemas.microsoft.com/office/mac/drawingml/2011/main" val="1"/>
             </a:ext>
           </a:extLst>
         </p:spPr>

</xml_diff>